<commit_message>
[V0.4] Update developer's guide
</commit_message>
<xml_diff>
--- a/docs/diagrams/UiComponentClassDiagram.pptx
+++ b/docs/diagrams/UiComponentClassDiagram.pptx
@@ -208,7 +208,7 @@
           <a:p>
             <a:fld id="{F5CC4B3F-88C1-4FFA-B1B6-F41C21DC6924}" type="datetimeFigureOut">
               <a:rPr lang="en-US" smtClean="0"/>
-              <a:t>1/7/2017</a:t>
+              <a:t>3/22/17</a:t>
             </a:fld>
             <a:endParaRPr lang="en-US"/>
           </a:p>
@@ -654,7 +654,7 @@
           <a:p>
             <a:fld id="{78C97017-6FC3-485B-9764-EAC9E56C1D49}" type="datetimeFigureOut">
               <a:rPr lang="en-US" smtClean="0"/>
-              <a:t>1/7/2017</a:t>
+              <a:t>3/22/17</a:t>
             </a:fld>
             <a:endParaRPr lang="en-US"/>
           </a:p>
@@ -822,7 +822,7 @@
           <a:p>
             <a:fld id="{78C97017-6FC3-485B-9764-EAC9E56C1D49}" type="datetimeFigureOut">
               <a:rPr lang="en-US" smtClean="0"/>
-              <a:t>1/7/2017</a:t>
+              <a:t>3/22/17</a:t>
             </a:fld>
             <a:endParaRPr lang="en-US"/>
           </a:p>
@@ -1000,7 +1000,7 @@
           <a:p>
             <a:fld id="{78C97017-6FC3-485B-9764-EAC9E56C1D49}" type="datetimeFigureOut">
               <a:rPr lang="en-US" smtClean="0"/>
-              <a:t>1/7/2017</a:t>
+              <a:t>3/22/17</a:t>
             </a:fld>
             <a:endParaRPr lang="en-US"/>
           </a:p>
@@ -1168,7 +1168,7 @@
           <a:p>
             <a:fld id="{78C97017-6FC3-485B-9764-EAC9E56C1D49}" type="datetimeFigureOut">
               <a:rPr lang="en-US" smtClean="0"/>
-              <a:t>1/7/2017</a:t>
+              <a:t>3/22/17</a:t>
             </a:fld>
             <a:endParaRPr lang="en-US"/>
           </a:p>
@@ -1413,7 +1413,7 @@
           <a:p>
             <a:fld id="{78C97017-6FC3-485B-9764-EAC9E56C1D49}" type="datetimeFigureOut">
               <a:rPr lang="en-US" smtClean="0"/>
-              <a:t>1/7/2017</a:t>
+              <a:t>3/22/17</a:t>
             </a:fld>
             <a:endParaRPr lang="en-US"/>
           </a:p>
@@ -1698,7 +1698,7 @@
           <a:p>
             <a:fld id="{78C97017-6FC3-485B-9764-EAC9E56C1D49}" type="datetimeFigureOut">
               <a:rPr lang="en-US" smtClean="0"/>
-              <a:t>1/7/2017</a:t>
+              <a:t>3/22/17</a:t>
             </a:fld>
             <a:endParaRPr lang="en-US"/>
           </a:p>
@@ -2117,7 +2117,7 @@
           <a:p>
             <a:fld id="{78C97017-6FC3-485B-9764-EAC9E56C1D49}" type="datetimeFigureOut">
               <a:rPr lang="en-US" smtClean="0"/>
-              <a:t>1/7/2017</a:t>
+              <a:t>3/22/17</a:t>
             </a:fld>
             <a:endParaRPr lang="en-US"/>
           </a:p>
@@ -2234,7 +2234,7 @@
           <a:p>
             <a:fld id="{78C97017-6FC3-485B-9764-EAC9E56C1D49}" type="datetimeFigureOut">
               <a:rPr lang="en-US" smtClean="0"/>
-              <a:t>1/7/2017</a:t>
+              <a:t>3/22/17</a:t>
             </a:fld>
             <a:endParaRPr lang="en-US"/>
           </a:p>
@@ -2329,7 +2329,7 @@
           <a:p>
             <a:fld id="{78C97017-6FC3-485B-9764-EAC9E56C1D49}" type="datetimeFigureOut">
               <a:rPr lang="en-US" smtClean="0"/>
-              <a:t>1/7/2017</a:t>
+              <a:t>3/22/17</a:t>
             </a:fld>
             <a:endParaRPr lang="en-US"/>
           </a:p>
@@ -2604,7 +2604,7 @@
           <a:p>
             <a:fld id="{78C97017-6FC3-485B-9764-EAC9E56C1D49}" type="datetimeFigureOut">
               <a:rPr lang="en-US" smtClean="0"/>
-              <a:t>1/7/2017</a:t>
+              <a:t>3/22/17</a:t>
             </a:fld>
             <a:endParaRPr lang="en-US"/>
           </a:p>
@@ -2856,7 +2856,7 @@
           <a:p>
             <a:fld id="{78C97017-6FC3-485B-9764-EAC9E56C1D49}" type="datetimeFigureOut">
               <a:rPr lang="en-US" smtClean="0"/>
-              <a:t>1/7/2017</a:t>
+              <a:t>3/22/17</a:t>
             </a:fld>
             <a:endParaRPr lang="en-US"/>
           </a:p>
@@ -3067,7 +3067,7 @@
           <a:p>
             <a:fld id="{78C97017-6FC3-485B-9764-EAC9E56C1D49}" type="datetimeFigureOut">
               <a:rPr lang="en-US" smtClean="0"/>
-              <a:t>1/7/2017</a:t>
+              <a:t>3/22/17</a:t>
             </a:fld>
             <a:endParaRPr lang="en-US"/>
           </a:p>
@@ -3918,14 +3918,24 @@
           <a:p>
             <a:pPr algn="ctr"/>
             <a:r>
-              <a:rPr lang="en-US" sz="1050" b="1" dirty="0" err="1">
+              <a:rPr lang="en-US" altLang="zh-CN" sz="1050" b="1" dirty="0" err="1" smtClean="0">
                 <a:solidFill>
                   <a:schemeClr val="accent3">
                     <a:lumMod val="75000"/>
                   </a:schemeClr>
                 </a:solidFill>
               </a:rPr>
-              <a:t>BrowserPanel</a:t>
+              <a:t>TagList</a:t>
+            </a:r>
+            <a:r>
+              <a:rPr lang="en-US" sz="1050" b="1" dirty="0" err="1" smtClean="0">
+                <a:solidFill>
+                  <a:schemeClr val="accent3">
+                    <a:lumMod val="75000"/>
+                  </a:schemeClr>
+                </a:solidFill>
+              </a:rPr>
+              <a:t>Panel</a:t>
             </a:r>
             <a:endParaRPr lang="en-SG" sz="1050" b="1" dirty="0">
               <a:solidFill>
@@ -4005,7 +4015,7 @@
         </p:nvSpPr>
         <p:spPr>
           <a:xfrm>
-            <a:off x="2592526" y="3991960"/>
+            <a:off x="2580909" y="4110791"/>
             <a:ext cx="1093635" cy="236841"/>
           </a:xfrm>
           <a:prstGeom prst="rect">
@@ -4038,14 +4048,24 @@
           <a:p>
             <a:pPr algn="ctr"/>
             <a:r>
-              <a:rPr lang="en-US" sz="1050" b="1" dirty="0" err="1">
+              <a:rPr lang="en-US" altLang="zh-CN" sz="1050" b="1" dirty="0" err="1" smtClean="0">
                 <a:solidFill>
                   <a:schemeClr val="accent3">
                     <a:lumMod val="75000"/>
                   </a:schemeClr>
                 </a:solidFill>
               </a:rPr>
-              <a:t>PersonListPanel</a:t>
+              <a:t>Task</a:t>
+            </a:r>
+            <a:r>
+              <a:rPr lang="en-US" sz="1050" b="1" dirty="0" err="1" smtClean="0">
+                <a:solidFill>
+                  <a:schemeClr val="accent3">
+                    <a:lumMod val="75000"/>
+                  </a:schemeClr>
+                </a:solidFill>
+              </a:rPr>
+              <a:t>ListPanel</a:t>
             </a:r>
             <a:endParaRPr lang="en-SG" sz="1050" b="1" dirty="0">
               <a:solidFill>
@@ -4065,7 +4085,7 @@
         </p:nvSpPr>
         <p:spPr>
           <a:xfrm>
-            <a:off x="3839323" y="4228801"/>
+            <a:off x="3862559" y="4327193"/>
             <a:ext cx="1040906" cy="236841"/>
           </a:xfrm>
           <a:prstGeom prst="rect">
@@ -4098,74 +4118,24 @@
           <a:p>
             <a:pPr algn="ctr"/>
             <a:r>
-              <a:rPr lang="en-US" sz="1050" b="1" dirty="0" err="1">
+              <a:rPr lang="en-US" altLang="zh-CN" sz="1050" b="1" dirty="0" err="1" smtClean="0">
                 <a:solidFill>
                   <a:schemeClr val="accent3">
                     <a:lumMod val="75000"/>
                   </a:schemeClr>
                 </a:solidFill>
               </a:rPr>
-              <a:t>PersonCard</a:t>
-            </a:r>
-            <a:endParaRPr lang="en-SG" sz="1050" b="1" dirty="0">
-              <a:solidFill>
-                <a:schemeClr val="accent3">
-                  <a:lumMod val="75000"/>
-                </a:schemeClr>
-              </a:solidFill>
-            </a:endParaRPr>
-          </a:p>
-        </p:txBody>
-      </p:sp>
-      <p:sp>
-        <p:nvSpPr>
-          <p:cNvPr id="38" name="Rectangle 11"/>
-          <p:cNvSpPr/>
-          <p:nvPr/>
-        </p:nvSpPr>
-        <p:spPr>
-          <a:xfrm>
-            <a:off x="2592528" y="4966000"/>
-            <a:ext cx="1093635" cy="236841"/>
-          </a:xfrm>
-          <a:prstGeom prst="rect">
-            <a:avLst/>
-          </a:prstGeom>
-          <a:ln w="19050">
-            <a:solidFill>
-              <a:schemeClr val="accent3"/>
-            </a:solidFill>
-          </a:ln>
-          <a:effectLst/>
-        </p:spPr>
-        <p:style>
-          <a:lnRef idx="1">
-            <a:schemeClr val="accent3"/>
-          </a:lnRef>
-          <a:fillRef idx="2">
-            <a:schemeClr val="accent3"/>
-          </a:fillRef>
-          <a:effectRef idx="1">
-            <a:schemeClr val="accent3"/>
-          </a:effectRef>
-          <a:fontRef idx="minor">
-            <a:schemeClr val="dk1"/>
-          </a:fontRef>
-        </p:style>
-        <p:txBody>
-          <a:bodyPr rtlCol="0" anchor="ctr"/>
-          <a:lstStyle/>
-          <a:p>
-            <a:pPr algn="ctr"/>
-            <a:r>
-              <a:rPr lang="en-US" sz="1050" b="1" dirty="0" err="1">
+              <a:t>Task</a:t>
+            </a:r>
+            <a:r>
+              <a:rPr lang="en-US" sz="1050" b="1" dirty="0" err="1" smtClean="0">
                 <a:solidFill>
                   <a:schemeClr val="accent3">
                     <a:lumMod val="75000"/>
                   </a:schemeClr>
                 </a:solidFill>
               </a:rPr>
-              <a:t>HelpWindow</a:t>
+              <a:t>Card</a:t>
             </a:r>
             <a:endParaRPr lang="en-SG" sz="1050" b="1" dirty="0">
               <a:solidFill>
@@ -4370,15 +4340,12 @@
       <p:cxnSp>
         <p:nvCxnSpPr>
           <p:cNvPr id="47" name="Elbow Connector 63"/>
-          <p:cNvCxnSpPr>
-            <a:stCxn id="39" idx="2"/>
-            <a:endCxn id="36" idx="1"/>
-          </p:cNvCxnSpPr>
+          <p:cNvCxnSpPr/>
           <p:nvPr/>
         </p:nvCxnSpPr>
         <p:spPr>
           <a:xfrm rot="16200000" flipH="1">
-            <a:off x="1883148" y="3401003"/>
+            <a:off x="1881419" y="3527612"/>
             <a:ext cx="1242356" cy="176400"/>
           </a:xfrm>
           <a:prstGeom prst="bentConnector2">
@@ -4449,46 +4416,6 @@
           </a:fontRef>
         </p:style>
       </p:cxnSp>
-      <p:cxnSp>
-        <p:nvCxnSpPr>
-          <p:cNvPr id="53" name="Elbow Connector 63"/>
-          <p:cNvCxnSpPr>
-            <a:endCxn id="38" idx="1"/>
-          </p:cNvCxnSpPr>
-          <p:nvPr/>
-        </p:nvCxnSpPr>
-        <p:spPr>
-          <a:xfrm rot="16200000" flipH="1">
-            <a:off x="1184119" y="3676012"/>
-            <a:ext cx="2396440" cy="420377"/>
-          </a:xfrm>
-          <a:prstGeom prst="bentConnector2">
-            <a:avLst/>
-          </a:prstGeom>
-          <a:ln w="19050">
-            <a:solidFill>
-              <a:schemeClr val="accent3"/>
-            </a:solidFill>
-            <a:headEnd type="none" w="med" len="med"/>
-            <a:tailEnd type="arrow" w="med" len="med"/>
-          </a:ln>
-          <a:effectLst/>
-        </p:spPr>
-        <p:style>
-          <a:lnRef idx="1">
-            <a:schemeClr val="accent2"/>
-          </a:lnRef>
-          <a:fillRef idx="2">
-            <a:schemeClr val="accent2"/>
-          </a:fillRef>
-          <a:effectRef idx="1">
-            <a:schemeClr val="accent2"/>
-          </a:effectRef>
-          <a:fontRef idx="minor">
-            <a:schemeClr val="dk1"/>
-          </a:fontRef>
-        </p:style>
-      </p:cxnSp>
       <p:sp>
         <p:nvSpPr>
           <p:cNvPr id="73" name="Rectangle 62"/>
@@ -4620,8 +4547,8 @@
         </p:nvCxnSpPr>
         <p:spPr>
           <a:xfrm rot="5400000">
-            <a:off x="4174488" y="2991741"/>
-            <a:ext cx="2061222" cy="649740"/>
+            <a:off x="4136910" y="3052555"/>
+            <a:ext cx="2159614" cy="626504"/>
           </a:xfrm>
           <a:prstGeom prst="bentConnector2">
             <a:avLst/>
@@ -4735,57 +4662,13 @@
       <p:cxnSp>
         <p:nvCxnSpPr>
           <p:cNvPr id="91" name="Elbow Connector 63"/>
-          <p:cNvCxnSpPr>
-            <a:stCxn id="16" idx="3"/>
-            <a:endCxn id="35" idx="3"/>
-          </p:cNvCxnSpPr>
+          <p:cNvCxnSpPr/>
           <p:nvPr/>
         </p:nvCxnSpPr>
         <p:spPr>
           <a:xfrm rot="5400000">
-            <a:off x="3409976" y="2562187"/>
+            <a:off x="3409975" y="2609660"/>
             <a:ext cx="2396180" cy="1843807"/>
-          </a:xfrm>
-          <a:prstGeom prst="bentConnector2">
-            <a:avLst/>
-          </a:prstGeom>
-          <a:ln w="6350">
-            <a:solidFill>
-              <a:schemeClr val="accent3"/>
-            </a:solidFill>
-            <a:headEnd type="none" w="med" len="med"/>
-            <a:tailEnd type="none" w="med" len="med"/>
-          </a:ln>
-          <a:effectLst/>
-        </p:spPr>
-        <p:style>
-          <a:lnRef idx="1">
-            <a:schemeClr val="accent2"/>
-          </a:lnRef>
-          <a:fillRef idx="2">
-            <a:schemeClr val="accent2"/>
-          </a:fillRef>
-          <a:effectRef idx="1">
-            <a:schemeClr val="accent2"/>
-          </a:effectRef>
-          <a:fontRef idx="minor">
-            <a:schemeClr val="dk1"/>
-          </a:fontRef>
-        </p:style>
-      </p:cxnSp>
-      <p:cxnSp>
-        <p:nvCxnSpPr>
-          <p:cNvPr id="94" name="Elbow Connector 63"/>
-          <p:cNvCxnSpPr>
-            <a:stCxn id="16" idx="3"/>
-            <a:endCxn id="38" idx="3"/>
-          </p:cNvCxnSpPr>
-          <p:nvPr/>
-        </p:nvCxnSpPr>
-        <p:spPr>
-          <a:xfrm rot="5400000">
-            <a:off x="3208856" y="2763307"/>
-            <a:ext cx="2798421" cy="1843806"/>
           </a:xfrm>
           <a:prstGeom prst="bentConnector2">
             <a:avLst/>
@@ -4863,7 +4746,7 @@
         </p:nvSpPr>
         <p:spPr>
           <a:xfrm rot="16200000">
-            <a:off x="6213739" y="4560376"/>
+            <a:off x="6206629" y="4404146"/>
             <a:ext cx="1371599" cy="328045"/>
           </a:xfrm>
           <a:prstGeom prst="roundRect">
@@ -5159,58 +5042,14 @@
       </p:cxnSp>
       <p:cxnSp>
         <p:nvCxnSpPr>
-          <p:cNvPr id="137" name="Elbow Connector 136"/>
-          <p:cNvCxnSpPr>
-            <a:stCxn id="36" idx="2"/>
-            <a:endCxn id="37" idx="1"/>
-          </p:cNvCxnSpPr>
+          <p:cNvPr id="140" name="Elbow Connector 63"/>
+          <p:cNvCxnSpPr/>
           <p:nvPr/>
         </p:nvCxnSpPr>
         <p:spPr>
-          <a:xfrm rot="16200000" flipH="1">
-            <a:off x="3430123" y="3938021"/>
-            <a:ext cx="118421" cy="699979"/>
-          </a:xfrm>
-          <a:prstGeom prst="bentConnector2">
-            <a:avLst/>
-          </a:prstGeom>
-          <a:ln w="19050">
-            <a:solidFill>
-              <a:schemeClr val="accent3"/>
-            </a:solidFill>
-            <a:headEnd type="none" w="med" len="med"/>
-            <a:tailEnd type="arrow" w="med" len="med"/>
-          </a:ln>
-          <a:effectLst/>
-        </p:spPr>
-        <p:style>
-          <a:lnRef idx="1">
-            <a:schemeClr val="accent2"/>
-          </a:lnRef>
-          <a:fillRef idx="2">
-            <a:schemeClr val="accent2"/>
-          </a:fillRef>
-          <a:effectRef idx="1">
-            <a:schemeClr val="accent2"/>
-          </a:effectRef>
-          <a:fontRef idx="minor">
-            <a:schemeClr val="dk1"/>
-          </a:fontRef>
-        </p:style>
-      </p:cxnSp>
-      <p:cxnSp>
-        <p:nvCxnSpPr>
-          <p:cNvPr id="140" name="Elbow Connector 63"/>
-          <p:cNvCxnSpPr>
-            <a:stCxn id="16" idx="3"/>
-            <a:endCxn id="36" idx="3"/>
-          </p:cNvCxnSpPr>
-          <p:nvPr/>
-        </p:nvCxnSpPr>
-        <p:spPr>
           <a:xfrm rot="5400000">
-            <a:off x="3695875" y="2276286"/>
-            <a:ext cx="1824381" cy="1843808"/>
+            <a:off x="3630650" y="2371735"/>
+            <a:ext cx="1943212" cy="1855425"/>
           </a:xfrm>
           <a:prstGeom prst="bentConnector2">
             <a:avLst/>
@@ -5435,8 +5274,236 @@
         </p:nvSpPr>
         <p:spPr>
           <a:xfrm flipV="1">
-            <a:off x="4114799" y="4472708"/>
-            <a:ext cx="2642195" cy="101600"/>
+            <a:off x="4410007" y="4557694"/>
+            <a:ext cx="2318399" cy="78708"/>
+          </a:xfrm>
+          <a:custGeom>
+            <a:avLst/>
+            <a:gdLst>
+              <a:gd name="connsiteX0" fmla="*/ 0 w 3048000"/>
+              <a:gd name="connsiteY0" fmla="*/ 203200 h 203200"/>
+              <a:gd name="connsiteX1" fmla="*/ 221673 w 3048000"/>
+              <a:gd name="connsiteY1" fmla="*/ 0 h 203200"/>
+              <a:gd name="connsiteX2" fmla="*/ 3048000 w 3048000"/>
+              <a:gd name="connsiteY2" fmla="*/ 0 h 203200"/>
+            </a:gdLst>
+            <a:ahLst/>
+            <a:cxnLst>
+              <a:cxn ang="0">
+                <a:pos x="connsiteX0" y="connsiteY0"/>
+              </a:cxn>
+              <a:cxn ang="0">
+                <a:pos x="connsiteX1" y="connsiteY1"/>
+              </a:cxn>
+              <a:cxn ang="0">
+                <a:pos x="connsiteX2" y="connsiteY2"/>
+              </a:cxn>
+            </a:cxnLst>
+            <a:rect l="l" t="t" r="r" b="b"/>
+            <a:pathLst>
+              <a:path w="3048000" h="203200">
+                <a:moveTo>
+                  <a:pt x="0" y="203200"/>
+                </a:moveTo>
+                <a:lnTo>
+                  <a:pt x="221673" y="0"/>
+                </a:lnTo>
+                <a:lnTo>
+                  <a:pt x="3048000" y="0"/>
+                </a:lnTo>
+              </a:path>
+            </a:pathLst>
+          </a:custGeom>
+          <a:noFill/>
+          <a:ln w="19050">
+            <a:solidFill>
+              <a:schemeClr val="accent3"/>
+            </a:solidFill>
+            <a:prstDash val="sysDot"/>
+            <a:headEnd type="none" w="med" len="med"/>
+            <a:tailEnd type="arrow" w="med" len="med"/>
+          </a:ln>
+          <a:effectLst/>
+        </p:spPr>
+        <p:style>
+          <a:lnRef idx="1">
+            <a:schemeClr val="accent2"/>
+          </a:lnRef>
+          <a:fillRef idx="2">
+            <a:schemeClr val="accent2"/>
+          </a:fillRef>
+          <a:effectRef idx="1">
+            <a:schemeClr val="accent2"/>
+          </a:effectRef>
+          <a:fontRef idx="minor">
+            <a:schemeClr val="dk1"/>
+          </a:fontRef>
+        </p:style>
+        <p:txBody>
+          <a:bodyPr rtlCol="0" anchor="ctr"/>
+          <a:lstStyle/>
+          <a:p>
+            <a:pPr algn="ctr"/>
+            <a:endParaRPr lang="en-SG"/>
+          </a:p>
+        </p:txBody>
+      </p:sp>
+      <p:cxnSp>
+        <p:nvCxnSpPr>
+          <p:cNvPr id="42" name="Elbow Connector 41"/>
+          <p:cNvCxnSpPr/>
+          <p:nvPr/>
+        </p:nvCxnSpPr>
+        <p:spPr>
+          <a:xfrm rot="16200000" flipH="1">
+            <a:off x="3435378" y="3594255"/>
+            <a:ext cx="118421" cy="699979"/>
+          </a:xfrm>
+          <a:prstGeom prst="bentConnector2">
+            <a:avLst/>
+          </a:prstGeom>
+          <a:ln w="19050">
+            <a:solidFill>
+              <a:schemeClr val="accent3"/>
+            </a:solidFill>
+            <a:headEnd type="none" w="med" len="med"/>
+            <a:tailEnd type="arrow" w="med" len="med"/>
+          </a:ln>
+          <a:effectLst/>
+        </p:spPr>
+        <p:style>
+          <a:lnRef idx="1">
+            <a:schemeClr val="accent2"/>
+          </a:lnRef>
+          <a:fillRef idx="2">
+            <a:schemeClr val="accent2"/>
+          </a:fillRef>
+          <a:effectRef idx="1">
+            <a:schemeClr val="accent2"/>
+          </a:effectRef>
+          <a:fontRef idx="minor">
+            <a:schemeClr val="dk1"/>
+          </a:fontRef>
+        </p:style>
+      </p:cxnSp>
+      <p:cxnSp>
+        <p:nvCxnSpPr>
+          <p:cNvPr id="48" name="Elbow Connector 47"/>
+          <p:cNvCxnSpPr/>
+          <p:nvPr/>
+        </p:nvCxnSpPr>
+        <p:spPr>
+          <a:xfrm rot="16200000" flipH="1">
+            <a:off x="3469229" y="4063016"/>
+            <a:ext cx="118421" cy="699979"/>
+          </a:xfrm>
+          <a:prstGeom prst="bentConnector2">
+            <a:avLst/>
+          </a:prstGeom>
+          <a:ln w="19050">
+            <a:solidFill>
+              <a:schemeClr val="accent3"/>
+            </a:solidFill>
+            <a:headEnd type="none" w="med" len="med"/>
+            <a:tailEnd type="arrow" w="med" len="med"/>
+          </a:ln>
+          <a:effectLst/>
+        </p:spPr>
+        <p:style>
+          <a:lnRef idx="1">
+            <a:schemeClr val="accent2"/>
+          </a:lnRef>
+          <a:fillRef idx="2">
+            <a:schemeClr val="accent2"/>
+          </a:fillRef>
+          <a:effectRef idx="1">
+            <a:schemeClr val="accent2"/>
+          </a:effectRef>
+          <a:fontRef idx="minor">
+            <a:schemeClr val="dk1"/>
+          </a:fontRef>
+        </p:style>
+      </p:cxnSp>
+      <p:sp>
+        <p:nvSpPr>
+          <p:cNvPr id="49" name="Rectangle 11"/>
+          <p:cNvSpPr/>
+          <p:nvPr/>
+        </p:nvSpPr>
+        <p:spPr>
+          <a:xfrm>
+            <a:off x="3858491" y="3897006"/>
+            <a:ext cx="1040906" cy="236841"/>
+          </a:xfrm>
+          <a:prstGeom prst="rect">
+            <a:avLst/>
+          </a:prstGeom>
+          <a:ln w="19050">
+            <a:solidFill>
+              <a:schemeClr val="accent3"/>
+            </a:solidFill>
+          </a:ln>
+          <a:effectLst/>
+        </p:spPr>
+        <p:style>
+          <a:lnRef idx="1">
+            <a:schemeClr val="accent3"/>
+          </a:lnRef>
+          <a:fillRef idx="2">
+            <a:schemeClr val="accent3"/>
+          </a:fillRef>
+          <a:effectRef idx="1">
+            <a:schemeClr val="accent3"/>
+          </a:effectRef>
+          <a:fontRef idx="minor">
+            <a:schemeClr val="dk1"/>
+          </a:fontRef>
+        </p:style>
+        <p:txBody>
+          <a:bodyPr rtlCol="0" anchor="ctr"/>
+          <a:lstStyle/>
+          <a:p>
+            <a:pPr algn="ctr"/>
+            <a:r>
+              <a:rPr lang="en-US" altLang="zh-CN" sz="1050" b="1" dirty="0" err="1" smtClean="0">
+                <a:solidFill>
+                  <a:schemeClr val="accent3">
+                    <a:lumMod val="75000"/>
+                  </a:schemeClr>
+                </a:solidFill>
+              </a:rPr>
+              <a:t>Tag</a:t>
+            </a:r>
+            <a:r>
+              <a:rPr lang="en-US" sz="1050" b="1" dirty="0" err="1" smtClean="0">
+                <a:solidFill>
+                  <a:schemeClr val="accent3">
+                    <a:lumMod val="75000"/>
+                  </a:schemeClr>
+                </a:solidFill>
+              </a:rPr>
+              <a:t>Card</a:t>
+            </a:r>
+            <a:endParaRPr lang="en-SG" sz="1050" b="1" dirty="0">
+              <a:solidFill>
+                <a:schemeClr val="accent3">
+                  <a:lumMod val="75000"/>
+                </a:schemeClr>
+              </a:solidFill>
+            </a:endParaRPr>
+          </a:p>
+        </p:txBody>
+      </p:sp>
+      <p:sp>
+        <p:nvSpPr>
+          <p:cNvPr id="51" name="Freeform 50"/>
+          <p:cNvSpPr/>
+          <p:nvPr/>
+        </p:nvSpPr>
+        <p:spPr>
+          <a:xfrm flipV="1">
+            <a:off x="4301117" y="4142607"/>
+            <a:ext cx="2434398" cy="89219"/>
           </a:xfrm>
           <a:custGeom>
             <a:avLst/>

</xml_diff>